<commit_message>
Updates for the presentation
</commit_message>
<xml_diff>
--- a/Vilhuber-Presentation2019-SFO-2019-06-29.pptx
+++ b/Vilhuber-Presentation2019-SFO-2019-06-29.pptx
@@ -131,17 +131,17 @@
   <p:notesSz cx="6858000" cy="9144000"/>
   <p:embeddedFontLst>
     <p:embeddedFont>
-      <p:font typeface="Roboto" panose="020B0604020202020204" charset="0"/>
+      <p:font typeface="Century" panose="02040604050505020304" pitchFamily="18" charset="0"/>
       <p:regular r:id="rId121"/>
     </p:embeddedFont>
     <p:embeddedFont>
-      <p:font typeface="Century" panose="02040604050505020304" pitchFamily="18" charset="0"/>
+      <p:font typeface="Calibri Light" panose="020F0302020204030204" pitchFamily="34" charset="0"/>
       <p:regular r:id="rId122"/>
+      <p:italic r:id="rId123"/>
     </p:embeddedFont>
     <p:embeddedFont>
-      <p:font typeface="Calibri Light" panose="020F0302020204030204" pitchFamily="34" charset="0"/>
-      <p:regular r:id="rId123"/>
-      <p:italic r:id="rId124"/>
+      <p:font typeface="Roboto" panose="020B0604020202020204" charset="0"/>
+      <p:regular r:id="rId124"/>
     </p:embeddedFont>
     <p:embeddedFont>
       <p:font typeface="Calibri" panose="020F0502020204030204" pitchFamily="34" charset="0"/>
@@ -9345,17 +9345,17 @@
               <a:rPr lang="en-US" dirty="0" smtClean="0"/>
             </a:br>
             <a:r>
-              <a:rPr lang="en-US" dirty="0"/>
+              <a:rPr lang="en-US"/>
               <a:t/>
             </a:r>
             <a:br>
-              <a:rPr lang="en-US" dirty="0"/>
+              <a:rPr lang="en-US"/>
             </a:br>
             <a:r>
-              <a:rPr lang="en-US" sz="7300" b="1" dirty="0" smtClean="0">
+              <a:rPr lang="en-US" sz="7300" b="1" smtClean="0">
                 <a:hlinkClick r:id="rId3"/>
               </a:rPr>
-              <a:t>https://lars.vilhuber.com/s</a:t>
+              <a:t>lars.vilhuber.com/s</a:t>
             </a:r>
             <a:r>
               <a:rPr lang="en-US" sz="7300" b="1" dirty="0" smtClean="0"/>

</xml_diff>